<commit_message>
Adding the main figure
</commit_message>
<xml_diff>
--- a/paper/figures/Figures.pptx
+++ b/paper/figures/Figures.pptx
@@ -4,9 +4,13 @@
   <p:sldMasterIdLst>
     <p:sldMasterId id="2147483648" r:id="rId1"/>
   </p:sldMasterIdLst>
+  <p:notesMasterIdLst>
+    <p:notesMasterId r:id="rId5"/>
+  </p:notesMasterIdLst>
   <p:sldIdLst>
     <p:sldId id="256" r:id="rId2"/>
     <p:sldId id="257" r:id="rId3"/>
+    <p:sldId id="258" r:id="rId4"/>
   </p:sldIdLst>
   <p:sldSz cx="9144000" cy="6858000" type="screen4x3"/>
   <p:notesSz cx="6858000" cy="9144000"/>
@@ -461,11 +465,11 @@
           <c:showBubbleSize val="0"/>
         </c:dLbls>
         <c:gapWidth val="150"/>
-        <c:axId val="1874391192"/>
-        <c:axId val="1861825000"/>
+        <c:axId val="-2139510664"/>
+        <c:axId val="-2028642776"/>
       </c:barChart>
       <c:catAx>
-        <c:axId val="1874391192"/>
+        <c:axId val="-2139510664"/>
         <c:scaling>
           <c:orientation val="minMax"/>
         </c:scaling>
@@ -487,7 +491,7 @@
             <a:endParaRPr lang="en-US"/>
           </a:p>
         </c:txPr>
-        <c:crossAx val="1861825000"/>
+        <c:crossAx val="-2028642776"/>
         <c:crosses val="autoZero"/>
         <c:auto val="1"/>
         <c:lblAlgn val="ctr"/>
@@ -495,7 +499,7 @@
         <c:noMultiLvlLbl val="0"/>
       </c:catAx>
       <c:valAx>
-        <c:axId val="1861825000"/>
+        <c:axId val="-2028642776"/>
         <c:scaling>
           <c:orientation val="minMax"/>
           <c:max val="3.0"/>
@@ -507,7 +511,7 @@
         <c:majorTickMark val="out"/>
         <c:minorTickMark val="none"/>
         <c:tickLblPos val="nextTo"/>
-        <c:crossAx val="1874391192"/>
+        <c:crossAx val="-2139510664"/>
         <c:crosses val="autoZero"/>
         <c:crossBetween val="between"/>
       </c:valAx>
@@ -589,6 +593,440 @@
     </cdr:sp>
   </cdr:relSizeAnchor>
 </c:userShapes>
+</file>
+
+<file path=ppt/notesMasters/notesMaster1.xml><?xml version="1.0" encoding="utf-8"?>
+<p:notesMaster xmlns:a="http://schemas.openxmlformats.org/drawingml/2006/main" xmlns:r="http://schemas.openxmlformats.org/officeDocument/2006/relationships" xmlns:p="http://schemas.openxmlformats.org/presentationml/2006/main">
+  <p:cSld>
+    <p:bg>
+      <p:bgRef idx="1001">
+        <a:schemeClr val="bg1"/>
+      </p:bgRef>
+    </p:bg>
+    <p:spTree>
+      <p:nvGrpSpPr>
+        <p:cNvPr id="1" name=""/>
+        <p:cNvGrpSpPr/>
+        <p:nvPr/>
+      </p:nvGrpSpPr>
+      <p:grpSpPr>
+        <a:xfrm>
+          <a:off x="0" y="0"/>
+          <a:ext cx="0" cy="0"/>
+          <a:chOff x="0" y="0"/>
+          <a:chExt cx="0" cy="0"/>
+        </a:xfrm>
+      </p:grpSpPr>
+      <p:sp>
+        <p:nvSpPr>
+          <p:cNvPr id="2" name="Header Placeholder 1"/>
+          <p:cNvSpPr>
+            <a:spLocks noGrp="1"/>
+          </p:cNvSpPr>
+          <p:nvPr>
+            <p:ph type="hdr" sz="quarter"/>
+          </p:nvPr>
+        </p:nvSpPr>
+        <p:spPr>
+          <a:xfrm>
+            <a:off x="0" y="0"/>
+            <a:ext cx="2971800" cy="457200"/>
+          </a:xfrm>
+          <a:prstGeom prst="rect">
+            <a:avLst/>
+          </a:prstGeom>
+        </p:spPr>
+        <p:txBody>
+          <a:bodyPr vert="horz" lIns="91440" tIns="45720" rIns="91440" bIns="45720" rtlCol="0"/>
+          <a:lstStyle>
+            <a:lvl1pPr algn="l">
+              <a:defRPr sz="1200"/>
+            </a:lvl1pPr>
+          </a:lstStyle>
+          <a:p>
+            <a:endParaRPr lang="en-US"/>
+          </a:p>
+        </p:txBody>
+      </p:sp>
+      <p:sp>
+        <p:nvSpPr>
+          <p:cNvPr id="3" name="Date Placeholder 2"/>
+          <p:cNvSpPr>
+            <a:spLocks noGrp="1"/>
+          </p:cNvSpPr>
+          <p:nvPr>
+            <p:ph type="dt" idx="1"/>
+          </p:nvPr>
+        </p:nvSpPr>
+        <p:spPr>
+          <a:xfrm>
+            <a:off x="3884613" y="0"/>
+            <a:ext cx="2971800" cy="457200"/>
+          </a:xfrm>
+          <a:prstGeom prst="rect">
+            <a:avLst/>
+          </a:prstGeom>
+        </p:spPr>
+        <p:txBody>
+          <a:bodyPr vert="horz" lIns="91440" tIns="45720" rIns="91440" bIns="45720" rtlCol="0"/>
+          <a:lstStyle>
+            <a:lvl1pPr algn="r">
+              <a:defRPr sz="1200"/>
+            </a:lvl1pPr>
+          </a:lstStyle>
+          <a:p>
+            <a:fld id="{C8819947-BA8E-2949-B0DD-BE392E009EED}" type="datetimeFigureOut">
+              <a:rPr lang="en-US" smtClean="0"/>
+              <a:t>11/11/18</a:t>
+            </a:fld>
+            <a:endParaRPr lang="en-US"/>
+          </a:p>
+        </p:txBody>
+      </p:sp>
+      <p:sp>
+        <p:nvSpPr>
+          <p:cNvPr id="4" name="Slide Image Placeholder 3"/>
+          <p:cNvSpPr>
+            <a:spLocks noGrp="1" noRot="1" noChangeAspect="1"/>
+          </p:cNvSpPr>
+          <p:nvPr>
+            <p:ph type="sldImg" idx="2"/>
+          </p:nvPr>
+        </p:nvSpPr>
+        <p:spPr>
+          <a:xfrm>
+            <a:off x="1143000" y="685800"/>
+            <a:ext cx="4572000" cy="3429000"/>
+          </a:xfrm>
+          <a:prstGeom prst="rect">
+            <a:avLst/>
+          </a:prstGeom>
+          <a:noFill/>
+          <a:ln w="12700">
+            <a:solidFill>
+              <a:prstClr val="black"/>
+            </a:solidFill>
+          </a:ln>
+        </p:spPr>
+        <p:txBody>
+          <a:bodyPr vert="horz" lIns="91440" tIns="45720" rIns="91440" bIns="45720" rtlCol="0" anchor="ctr"/>
+          <a:lstStyle/>
+          <a:p>
+            <a:endParaRPr lang="en-US"/>
+          </a:p>
+        </p:txBody>
+      </p:sp>
+      <p:sp>
+        <p:nvSpPr>
+          <p:cNvPr id="5" name="Notes Placeholder 4"/>
+          <p:cNvSpPr>
+            <a:spLocks noGrp="1"/>
+          </p:cNvSpPr>
+          <p:nvPr>
+            <p:ph type="body" sz="quarter" idx="3"/>
+          </p:nvPr>
+        </p:nvSpPr>
+        <p:spPr>
+          <a:xfrm>
+            <a:off x="685800" y="4343400"/>
+            <a:ext cx="5486400" cy="4114800"/>
+          </a:xfrm>
+          <a:prstGeom prst="rect">
+            <a:avLst/>
+          </a:prstGeom>
+        </p:spPr>
+        <p:txBody>
+          <a:bodyPr vert="horz" lIns="91440" tIns="45720" rIns="91440" bIns="45720" rtlCol="0"/>
+          <a:lstStyle/>
+          <a:p>
+            <a:pPr lvl="0"/>
+            <a:r>
+              <a:rPr lang="en-US" smtClean="0"/>
+              <a:t>Click to edit Master text styles</a:t>
+            </a:r>
+          </a:p>
+          <a:p>
+            <a:pPr lvl="1"/>
+            <a:r>
+              <a:rPr lang="en-US" smtClean="0"/>
+              <a:t>Second level</a:t>
+            </a:r>
+          </a:p>
+          <a:p>
+            <a:pPr lvl="2"/>
+            <a:r>
+              <a:rPr lang="en-US" smtClean="0"/>
+              <a:t>Third level</a:t>
+            </a:r>
+          </a:p>
+          <a:p>
+            <a:pPr lvl="3"/>
+            <a:r>
+              <a:rPr lang="en-US" smtClean="0"/>
+              <a:t>Fourth level</a:t>
+            </a:r>
+          </a:p>
+          <a:p>
+            <a:pPr lvl="4"/>
+            <a:r>
+              <a:rPr lang="en-US" smtClean="0"/>
+              <a:t>Fifth level</a:t>
+            </a:r>
+            <a:endParaRPr lang="en-US"/>
+          </a:p>
+        </p:txBody>
+      </p:sp>
+      <p:sp>
+        <p:nvSpPr>
+          <p:cNvPr id="6" name="Footer Placeholder 5"/>
+          <p:cNvSpPr>
+            <a:spLocks noGrp="1"/>
+          </p:cNvSpPr>
+          <p:nvPr>
+            <p:ph type="ftr" sz="quarter" idx="4"/>
+          </p:nvPr>
+        </p:nvSpPr>
+        <p:spPr>
+          <a:xfrm>
+            <a:off x="0" y="8685213"/>
+            <a:ext cx="2971800" cy="457200"/>
+          </a:xfrm>
+          <a:prstGeom prst="rect">
+            <a:avLst/>
+          </a:prstGeom>
+        </p:spPr>
+        <p:txBody>
+          <a:bodyPr vert="horz" lIns="91440" tIns="45720" rIns="91440" bIns="45720" rtlCol="0" anchor="b"/>
+          <a:lstStyle>
+            <a:lvl1pPr algn="l">
+              <a:defRPr sz="1200"/>
+            </a:lvl1pPr>
+          </a:lstStyle>
+          <a:p>
+            <a:endParaRPr lang="en-US"/>
+          </a:p>
+        </p:txBody>
+      </p:sp>
+      <p:sp>
+        <p:nvSpPr>
+          <p:cNvPr id="7" name="Slide Number Placeholder 6"/>
+          <p:cNvSpPr>
+            <a:spLocks noGrp="1"/>
+          </p:cNvSpPr>
+          <p:nvPr>
+            <p:ph type="sldNum" sz="quarter" idx="5"/>
+          </p:nvPr>
+        </p:nvSpPr>
+        <p:spPr>
+          <a:xfrm>
+            <a:off x="3884613" y="8685213"/>
+            <a:ext cx="2971800" cy="457200"/>
+          </a:xfrm>
+          <a:prstGeom prst="rect">
+            <a:avLst/>
+          </a:prstGeom>
+        </p:spPr>
+        <p:txBody>
+          <a:bodyPr vert="horz" lIns="91440" tIns="45720" rIns="91440" bIns="45720" rtlCol="0" anchor="b"/>
+          <a:lstStyle>
+            <a:lvl1pPr algn="r">
+              <a:defRPr sz="1200"/>
+            </a:lvl1pPr>
+          </a:lstStyle>
+          <a:p>
+            <a:fld id="{AF08C129-CA98-7643-83F1-08F18CFEDD30}" type="slidenum">
+              <a:rPr lang="en-US" smtClean="0"/>
+              <a:t>‹#›</a:t>
+            </a:fld>
+            <a:endParaRPr lang="en-US"/>
+          </a:p>
+        </p:txBody>
+      </p:sp>
+    </p:spTree>
+    <p:extLst>
+      <p:ext uri="{BB962C8B-B14F-4D97-AF65-F5344CB8AC3E}">
+        <p14:creationId xmlns:p14="http://schemas.microsoft.com/office/powerpoint/2010/main" val="1092571668"/>
+      </p:ext>
+    </p:extLst>
+  </p:cSld>
+  <p:clrMap bg1="lt1" tx1="dk1" bg2="lt2" tx2="dk2" accent1="accent1" accent2="accent2" accent3="accent3" accent4="accent4" accent5="accent5" accent6="accent6" hlink="hlink" folHlink="folHlink"/>
+  <p:notesStyle>
+    <a:lvl1pPr marL="0" algn="l" defTabSz="457200" rtl="0" eaLnBrk="1" latinLnBrk="0" hangingPunct="1">
+      <a:defRPr sz="1200" kern="1200">
+        <a:solidFill>
+          <a:schemeClr val="tx1"/>
+        </a:solidFill>
+        <a:latin typeface="+mn-lt"/>
+        <a:ea typeface="+mn-ea"/>
+        <a:cs typeface="+mn-cs"/>
+      </a:defRPr>
+    </a:lvl1pPr>
+    <a:lvl2pPr marL="457200" algn="l" defTabSz="457200" rtl="0" eaLnBrk="1" latinLnBrk="0" hangingPunct="1">
+      <a:defRPr sz="1200" kern="1200">
+        <a:solidFill>
+          <a:schemeClr val="tx1"/>
+        </a:solidFill>
+        <a:latin typeface="+mn-lt"/>
+        <a:ea typeface="+mn-ea"/>
+        <a:cs typeface="+mn-cs"/>
+      </a:defRPr>
+    </a:lvl2pPr>
+    <a:lvl3pPr marL="914400" algn="l" defTabSz="457200" rtl="0" eaLnBrk="1" latinLnBrk="0" hangingPunct="1">
+      <a:defRPr sz="1200" kern="1200">
+        <a:solidFill>
+          <a:schemeClr val="tx1"/>
+        </a:solidFill>
+        <a:latin typeface="+mn-lt"/>
+        <a:ea typeface="+mn-ea"/>
+        <a:cs typeface="+mn-cs"/>
+      </a:defRPr>
+    </a:lvl3pPr>
+    <a:lvl4pPr marL="1371600" algn="l" defTabSz="457200" rtl="0" eaLnBrk="1" latinLnBrk="0" hangingPunct="1">
+      <a:defRPr sz="1200" kern="1200">
+        <a:solidFill>
+          <a:schemeClr val="tx1"/>
+        </a:solidFill>
+        <a:latin typeface="+mn-lt"/>
+        <a:ea typeface="+mn-ea"/>
+        <a:cs typeface="+mn-cs"/>
+      </a:defRPr>
+    </a:lvl4pPr>
+    <a:lvl5pPr marL="1828800" algn="l" defTabSz="457200" rtl="0" eaLnBrk="1" latinLnBrk="0" hangingPunct="1">
+      <a:defRPr sz="1200" kern="1200">
+        <a:solidFill>
+          <a:schemeClr val="tx1"/>
+        </a:solidFill>
+        <a:latin typeface="+mn-lt"/>
+        <a:ea typeface="+mn-ea"/>
+        <a:cs typeface="+mn-cs"/>
+      </a:defRPr>
+    </a:lvl5pPr>
+    <a:lvl6pPr marL="2286000" algn="l" defTabSz="457200" rtl="0" eaLnBrk="1" latinLnBrk="0" hangingPunct="1">
+      <a:defRPr sz="1200" kern="1200">
+        <a:solidFill>
+          <a:schemeClr val="tx1"/>
+        </a:solidFill>
+        <a:latin typeface="+mn-lt"/>
+        <a:ea typeface="+mn-ea"/>
+        <a:cs typeface="+mn-cs"/>
+      </a:defRPr>
+    </a:lvl6pPr>
+    <a:lvl7pPr marL="2743200" algn="l" defTabSz="457200" rtl="0" eaLnBrk="1" latinLnBrk="0" hangingPunct="1">
+      <a:defRPr sz="1200" kern="1200">
+        <a:solidFill>
+          <a:schemeClr val="tx1"/>
+        </a:solidFill>
+        <a:latin typeface="+mn-lt"/>
+        <a:ea typeface="+mn-ea"/>
+        <a:cs typeface="+mn-cs"/>
+      </a:defRPr>
+    </a:lvl7pPr>
+    <a:lvl8pPr marL="3200400" algn="l" defTabSz="457200" rtl="0" eaLnBrk="1" latinLnBrk="0" hangingPunct="1">
+      <a:defRPr sz="1200" kern="1200">
+        <a:solidFill>
+          <a:schemeClr val="tx1"/>
+        </a:solidFill>
+        <a:latin typeface="+mn-lt"/>
+        <a:ea typeface="+mn-ea"/>
+        <a:cs typeface="+mn-cs"/>
+      </a:defRPr>
+    </a:lvl8pPr>
+    <a:lvl9pPr marL="3657600" algn="l" defTabSz="457200" rtl="0" eaLnBrk="1" latinLnBrk="0" hangingPunct="1">
+      <a:defRPr sz="1200" kern="1200">
+        <a:solidFill>
+          <a:schemeClr val="tx1"/>
+        </a:solidFill>
+        <a:latin typeface="+mn-lt"/>
+        <a:ea typeface="+mn-ea"/>
+        <a:cs typeface="+mn-cs"/>
+      </a:defRPr>
+    </a:lvl9pPr>
+  </p:notesStyle>
+</p:notesMaster>
+</file>
+
+<file path=ppt/notesSlides/notesSlide1.xml><?xml version="1.0" encoding="utf-8"?>
+<p:notes xmlns:a="http://schemas.openxmlformats.org/drawingml/2006/main" xmlns:r="http://schemas.openxmlformats.org/officeDocument/2006/relationships" xmlns:p="http://schemas.openxmlformats.org/presentationml/2006/main">
+  <p:cSld>
+    <p:spTree>
+      <p:nvGrpSpPr>
+        <p:cNvPr id="1" name=""/>
+        <p:cNvGrpSpPr/>
+        <p:nvPr/>
+      </p:nvGrpSpPr>
+      <p:grpSpPr>
+        <a:xfrm>
+          <a:off x="0" y="0"/>
+          <a:ext cx="0" cy="0"/>
+          <a:chOff x="0" y="0"/>
+          <a:chExt cx="0" cy="0"/>
+        </a:xfrm>
+      </p:grpSpPr>
+      <p:sp>
+        <p:nvSpPr>
+          <p:cNvPr id="2" name="Slide Image Placeholder 1"/>
+          <p:cNvSpPr>
+            <a:spLocks noGrp="1" noRot="1" noChangeAspect="1"/>
+          </p:cNvSpPr>
+          <p:nvPr>
+            <p:ph type="sldImg"/>
+          </p:nvPr>
+        </p:nvSpPr>
+        <p:spPr/>
+      </p:sp>
+      <p:sp>
+        <p:nvSpPr>
+          <p:cNvPr id="3" name="Notes Placeholder 2"/>
+          <p:cNvSpPr>
+            <a:spLocks noGrp="1"/>
+          </p:cNvSpPr>
+          <p:nvPr>
+            <p:ph type="body" idx="1"/>
+          </p:nvPr>
+        </p:nvSpPr>
+        <p:spPr/>
+        <p:txBody>
+          <a:bodyPr/>
+          <a:lstStyle/>
+          <a:p>
+            <a:endParaRPr lang="en-US" dirty="0"/>
+          </a:p>
+        </p:txBody>
+      </p:sp>
+      <p:sp>
+        <p:nvSpPr>
+          <p:cNvPr id="4" name="Slide Number Placeholder 3"/>
+          <p:cNvSpPr>
+            <a:spLocks noGrp="1"/>
+          </p:cNvSpPr>
+          <p:nvPr>
+            <p:ph type="sldNum" sz="quarter" idx="10"/>
+          </p:nvPr>
+        </p:nvSpPr>
+        <p:spPr/>
+        <p:txBody>
+          <a:bodyPr/>
+          <a:lstStyle/>
+          <a:p>
+            <a:fld id="{AF08C129-CA98-7643-83F1-08F18CFEDD30}" type="slidenum">
+              <a:rPr lang="en-US" smtClean="0"/>
+              <a:t>3</a:t>
+            </a:fld>
+            <a:endParaRPr lang="en-US"/>
+          </a:p>
+        </p:txBody>
+      </p:sp>
+    </p:spTree>
+    <p:extLst>
+      <p:ext uri="{BB962C8B-B14F-4D97-AF65-F5344CB8AC3E}">
+        <p14:creationId xmlns:p14="http://schemas.microsoft.com/office/powerpoint/2010/main" val="3228223328"/>
+      </p:ext>
+    </p:extLst>
+  </p:cSld>
+  <p:clrMapOvr>
+    <a:masterClrMapping/>
+  </p:clrMapOvr>
+</p:notes>
 </file>
 
 <file path=ppt/slideLayouts/slideLayout1.xml><?xml version="1.0" encoding="utf-8"?>
@@ -772,7 +1210,7 @@
           <a:p>
             <a:fld id="{CED58884-990F-F448-A340-6825F8217195}" type="datetimeFigureOut">
               <a:rPr lang="en-US" smtClean="0"/>
-              <a:t>10/16/18</a:t>
+              <a:t>11/11/18</a:t>
             </a:fld>
             <a:endParaRPr lang="en-US"/>
           </a:p>
@@ -942,7 +1380,7 @@
           <a:p>
             <a:fld id="{CED58884-990F-F448-A340-6825F8217195}" type="datetimeFigureOut">
               <a:rPr lang="en-US" smtClean="0"/>
-              <a:t>10/16/18</a:t>
+              <a:t>11/11/18</a:t>
             </a:fld>
             <a:endParaRPr lang="en-US"/>
           </a:p>
@@ -1122,7 +1560,7 @@
           <a:p>
             <a:fld id="{CED58884-990F-F448-A340-6825F8217195}" type="datetimeFigureOut">
               <a:rPr lang="en-US" smtClean="0"/>
-              <a:t>10/16/18</a:t>
+              <a:t>11/11/18</a:t>
             </a:fld>
             <a:endParaRPr lang="en-US"/>
           </a:p>
@@ -1292,7 +1730,7 @@
           <a:p>
             <a:fld id="{CED58884-990F-F448-A340-6825F8217195}" type="datetimeFigureOut">
               <a:rPr lang="en-US" smtClean="0"/>
-              <a:t>10/16/18</a:t>
+              <a:t>11/11/18</a:t>
             </a:fld>
             <a:endParaRPr lang="en-US"/>
           </a:p>
@@ -1538,7 +1976,7 @@
           <a:p>
             <a:fld id="{CED58884-990F-F448-A340-6825F8217195}" type="datetimeFigureOut">
               <a:rPr lang="en-US" smtClean="0"/>
-              <a:t>10/16/18</a:t>
+              <a:t>11/11/18</a:t>
             </a:fld>
             <a:endParaRPr lang="en-US"/>
           </a:p>
@@ -1826,7 +2264,7 @@
           <a:p>
             <a:fld id="{CED58884-990F-F448-A340-6825F8217195}" type="datetimeFigureOut">
               <a:rPr lang="en-US" smtClean="0"/>
-              <a:t>10/16/18</a:t>
+              <a:t>11/11/18</a:t>
             </a:fld>
             <a:endParaRPr lang="en-US"/>
           </a:p>
@@ -2248,7 +2686,7 @@
           <a:p>
             <a:fld id="{CED58884-990F-F448-A340-6825F8217195}" type="datetimeFigureOut">
               <a:rPr lang="en-US" smtClean="0"/>
-              <a:t>10/16/18</a:t>
+              <a:t>11/11/18</a:t>
             </a:fld>
             <a:endParaRPr lang="en-US"/>
           </a:p>
@@ -2366,7 +2804,7 @@
           <a:p>
             <a:fld id="{CED58884-990F-F448-A340-6825F8217195}" type="datetimeFigureOut">
               <a:rPr lang="en-US" smtClean="0"/>
-              <a:t>10/16/18</a:t>
+              <a:t>11/11/18</a:t>
             </a:fld>
             <a:endParaRPr lang="en-US"/>
           </a:p>
@@ -2461,7 +2899,7 @@
           <a:p>
             <a:fld id="{CED58884-990F-F448-A340-6825F8217195}" type="datetimeFigureOut">
               <a:rPr lang="en-US" smtClean="0"/>
-              <a:t>10/16/18</a:t>
+              <a:t>11/11/18</a:t>
             </a:fld>
             <a:endParaRPr lang="en-US"/>
           </a:p>
@@ -2738,7 +3176,7 @@
           <a:p>
             <a:fld id="{CED58884-990F-F448-A340-6825F8217195}" type="datetimeFigureOut">
               <a:rPr lang="en-US" smtClean="0"/>
-              <a:t>10/16/18</a:t>
+              <a:t>11/11/18</a:t>
             </a:fld>
             <a:endParaRPr lang="en-US"/>
           </a:p>
@@ -2991,7 +3429,7 @@
           <a:p>
             <a:fld id="{CED58884-990F-F448-A340-6825F8217195}" type="datetimeFigureOut">
               <a:rPr lang="en-US" smtClean="0"/>
-              <a:t>10/16/18</a:t>
+              <a:t>11/11/18</a:t>
             </a:fld>
             <a:endParaRPr lang="en-US"/>
           </a:p>
@@ -3204,7 +3642,7 @@
           <a:p>
             <a:fld id="{CED58884-990F-F448-A340-6825F8217195}" type="datetimeFigureOut">
               <a:rPr lang="en-US" smtClean="0"/>
-              <a:t>10/16/18</a:t>
+              <a:t>11/11/18</a:t>
             </a:fld>
             <a:endParaRPr lang="en-US"/>
           </a:p>
@@ -3675,6 +4113,1746 @@
     <p:extLst>
       <p:ext uri="{BB962C8B-B14F-4D97-AF65-F5344CB8AC3E}">
         <p14:creationId xmlns:p14="http://schemas.microsoft.com/office/powerpoint/2010/main" val="3985231729"/>
+      </p:ext>
+    </p:extLst>
+  </p:cSld>
+  <p:clrMapOvr>
+    <a:masterClrMapping/>
+  </p:clrMapOvr>
+</p:sld>
+</file>
+
+<file path=ppt/slides/slide3.xml><?xml version="1.0" encoding="utf-8"?>
+<p:sld xmlns:a="http://schemas.openxmlformats.org/drawingml/2006/main" xmlns:r="http://schemas.openxmlformats.org/officeDocument/2006/relationships" xmlns:p="http://schemas.openxmlformats.org/presentationml/2006/main">
+  <p:cSld>
+    <p:spTree>
+      <p:nvGrpSpPr>
+        <p:cNvPr id="1" name=""/>
+        <p:cNvGrpSpPr/>
+        <p:nvPr/>
+      </p:nvGrpSpPr>
+      <p:grpSpPr>
+        <a:xfrm>
+          <a:off x="0" y="0"/>
+          <a:ext cx="0" cy="0"/>
+          <a:chOff x="0" y="0"/>
+          <a:chExt cx="0" cy="0"/>
+        </a:xfrm>
+      </p:grpSpPr>
+      <p:sp>
+        <p:nvSpPr>
+          <p:cNvPr id="4" name="Rectangle 3"/>
+          <p:cNvSpPr/>
+          <p:nvPr/>
+        </p:nvSpPr>
+        <p:spPr>
+          <a:xfrm>
+            <a:off x="444524" y="1463408"/>
+            <a:ext cx="1106639" cy="704093"/>
+          </a:xfrm>
+          <a:prstGeom prst="rect">
+            <a:avLst/>
+          </a:prstGeom>
+          <a:noFill/>
+          <a:ln>
+            <a:solidFill>
+              <a:schemeClr val="tx1"/>
+            </a:solidFill>
+          </a:ln>
+          <a:effectLst/>
+        </p:spPr>
+        <p:style>
+          <a:lnRef idx="1">
+            <a:schemeClr val="accent1"/>
+          </a:lnRef>
+          <a:fillRef idx="3">
+            <a:schemeClr val="accent1"/>
+          </a:fillRef>
+          <a:effectRef idx="2">
+            <a:schemeClr val="accent1"/>
+          </a:effectRef>
+          <a:fontRef idx="minor">
+            <a:schemeClr val="lt1"/>
+          </a:fontRef>
+        </p:style>
+        <p:txBody>
+          <a:bodyPr wrap="none" rtlCol="0" anchor="ctr"/>
+          <a:lstStyle/>
+          <a:p>
+            <a:pPr algn="ctr"/>
+            <a:endParaRPr lang="en-US" dirty="0"/>
+          </a:p>
+        </p:txBody>
+      </p:sp>
+      <p:sp>
+        <p:nvSpPr>
+          <p:cNvPr id="7" name="Rectangle 6"/>
+          <p:cNvSpPr/>
+          <p:nvPr/>
+        </p:nvSpPr>
+        <p:spPr>
+          <a:xfrm>
+            <a:off x="811037" y="1461244"/>
+            <a:ext cx="370063" cy="704093"/>
+          </a:xfrm>
+          <a:prstGeom prst="rect">
+            <a:avLst/>
+          </a:prstGeom>
+          <a:noFill/>
+          <a:ln>
+            <a:solidFill>
+              <a:schemeClr val="tx1"/>
+            </a:solidFill>
+          </a:ln>
+          <a:effectLst/>
+        </p:spPr>
+        <p:style>
+          <a:lnRef idx="1">
+            <a:schemeClr val="accent1"/>
+          </a:lnRef>
+          <a:fillRef idx="3">
+            <a:schemeClr val="accent1"/>
+          </a:fillRef>
+          <a:effectRef idx="2">
+            <a:schemeClr val="accent1"/>
+          </a:effectRef>
+          <a:fontRef idx="minor">
+            <a:schemeClr val="lt1"/>
+          </a:fontRef>
+        </p:style>
+        <p:txBody>
+          <a:bodyPr wrap="none" rtlCol="0" anchor="ctr"/>
+          <a:lstStyle/>
+          <a:p>
+            <a:pPr algn="ctr"/>
+            <a:endParaRPr lang="en-US" dirty="0"/>
+          </a:p>
+        </p:txBody>
+      </p:sp>
+      <p:sp>
+        <p:nvSpPr>
+          <p:cNvPr id="10" name="TextBox 9"/>
+          <p:cNvSpPr txBox="1"/>
+          <p:nvPr/>
+        </p:nvSpPr>
+        <p:spPr>
+          <a:xfrm>
+            <a:off x="406400" y="1623060"/>
+            <a:ext cx="452208" cy="246221"/>
+          </a:xfrm>
+          <a:prstGeom prst="rect">
+            <a:avLst/>
+          </a:prstGeom>
+          <a:noFill/>
+        </p:spPr>
+        <p:txBody>
+          <a:bodyPr wrap="square" rtlCol="0">
+            <a:spAutoFit/>
+          </a:bodyPr>
+          <a:lstStyle/>
+          <a:p>
+            <a:pPr algn="ctr"/>
+            <a:r>
+              <a:rPr lang="en-US" sz="1000" dirty="0" smtClean="0">
+                <a:latin typeface="Times New Roman"/>
+                <a:cs typeface="Times New Roman"/>
+              </a:rPr>
+              <a:t>……</a:t>
+            </a:r>
+            <a:endParaRPr lang="en-US" sz="1000" dirty="0">
+              <a:latin typeface="Times New Roman"/>
+              <a:cs typeface="Times New Roman"/>
+            </a:endParaRPr>
+          </a:p>
+        </p:txBody>
+      </p:sp>
+      <p:sp>
+        <p:nvSpPr>
+          <p:cNvPr id="11" name="TextBox 10"/>
+          <p:cNvSpPr txBox="1"/>
+          <p:nvPr/>
+        </p:nvSpPr>
+        <p:spPr>
+          <a:xfrm>
+            <a:off x="1144094" y="1623060"/>
+            <a:ext cx="441146" cy="246221"/>
+          </a:xfrm>
+          <a:prstGeom prst="rect">
+            <a:avLst/>
+          </a:prstGeom>
+          <a:noFill/>
+        </p:spPr>
+        <p:txBody>
+          <a:bodyPr wrap="none" rtlCol="0">
+            <a:spAutoFit/>
+          </a:bodyPr>
+          <a:lstStyle/>
+          <a:p>
+            <a:pPr algn="ctr"/>
+            <a:r>
+              <a:rPr lang="en-US" sz="1000" dirty="0" smtClean="0">
+                <a:latin typeface="Times New Roman"/>
+                <a:cs typeface="Times New Roman"/>
+              </a:rPr>
+              <a:t>……</a:t>
+            </a:r>
+            <a:endParaRPr lang="en-US" sz="1000" dirty="0">
+              <a:latin typeface="Times New Roman"/>
+              <a:cs typeface="Times New Roman"/>
+            </a:endParaRPr>
+          </a:p>
+        </p:txBody>
+      </p:sp>
+      <p:sp>
+        <p:nvSpPr>
+          <p:cNvPr id="13" name="TextBox 12"/>
+          <p:cNvSpPr txBox="1"/>
+          <p:nvPr/>
+        </p:nvSpPr>
+        <p:spPr>
+          <a:xfrm>
+            <a:off x="382358" y="1221814"/>
+            <a:ext cx="1236236" cy="246221"/>
+          </a:xfrm>
+          <a:prstGeom prst="rect">
+            <a:avLst/>
+          </a:prstGeom>
+          <a:noFill/>
+        </p:spPr>
+        <p:txBody>
+          <a:bodyPr wrap="none" rtlCol="0">
+            <a:spAutoFit/>
+          </a:bodyPr>
+          <a:lstStyle/>
+          <a:p>
+            <a:pPr algn="ctr"/>
+            <a:r>
+              <a:rPr lang="en-US" sz="1000" dirty="0" smtClean="0">
+                <a:latin typeface="Times New Roman"/>
+                <a:cs typeface="Times New Roman"/>
+              </a:rPr>
+              <a:t>MB-Based Mapping</a:t>
+            </a:r>
+            <a:endParaRPr lang="en-US" sz="1000" dirty="0">
+              <a:latin typeface="Times New Roman"/>
+              <a:cs typeface="Times New Roman"/>
+            </a:endParaRPr>
+          </a:p>
+        </p:txBody>
+      </p:sp>
+      <p:cxnSp>
+        <p:nvCxnSpPr>
+          <p:cNvPr id="15" name="Elbow Connector 14"/>
+          <p:cNvCxnSpPr>
+            <a:stCxn id="4" idx="2"/>
+          </p:cNvCxnSpPr>
+          <p:nvPr/>
+        </p:nvCxnSpPr>
+        <p:spPr>
+          <a:xfrm rot="16200000" flipH="1">
+            <a:off x="1395041" y="1770302"/>
+            <a:ext cx="1133" cy="795528"/>
+          </a:xfrm>
+          <a:prstGeom prst="bentConnector3">
+            <a:avLst>
+              <a:gd name="adj1" fmla="val 20276523"/>
+            </a:avLst>
+          </a:prstGeom>
+          <a:ln w="6350">
+            <a:solidFill>
+              <a:schemeClr val="tx1"/>
+            </a:solidFill>
+            <a:tailEnd type="arrow"/>
+          </a:ln>
+          <a:effectLst/>
+        </p:spPr>
+        <p:style>
+          <a:lnRef idx="2">
+            <a:schemeClr val="accent1"/>
+          </a:lnRef>
+          <a:fillRef idx="0">
+            <a:schemeClr val="accent1"/>
+          </a:fillRef>
+          <a:effectRef idx="1">
+            <a:schemeClr val="accent1"/>
+          </a:effectRef>
+          <a:fontRef idx="minor">
+            <a:schemeClr val="tx1"/>
+          </a:fontRef>
+        </p:style>
+      </p:cxnSp>
+      <p:sp>
+        <p:nvSpPr>
+          <p:cNvPr id="28" name="Rectangle 27"/>
+          <p:cNvSpPr/>
+          <p:nvPr/>
+        </p:nvSpPr>
+        <p:spPr>
+          <a:xfrm>
+            <a:off x="1793373" y="1462068"/>
+            <a:ext cx="813394" cy="704093"/>
+          </a:xfrm>
+          <a:prstGeom prst="rect">
+            <a:avLst/>
+          </a:prstGeom>
+          <a:noFill/>
+          <a:ln>
+            <a:solidFill>
+              <a:schemeClr val="tx1"/>
+            </a:solidFill>
+          </a:ln>
+          <a:effectLst/>
+        </p:spPr>
+        <p:style>
+          <a:lnRef idx="1">
+            <a:schemeClr val="accent1"/>
+          </a:lnRef>
+          <a:fillRef idx="3">
+            <a:schemeClr val="accent1"/>
+          </a:fillRef>
+          <a:effectRef idx="2">
+            <a:schemeClr val="accent1"/>
+          </a:effectRef>
+          <a:fontRef idx="minor">
+            <a:schemeClr val="lt1"/>
+          </a:fontRef>
+        </p:style>
+        <p:txBody>
+          <a:bodyPr wrap="none" rtlCol="0" anchor="ctr"/>
+          <a:lstStyle/>
+          <a:p>
+            <a:pPr algn="ctr"/>
+            <a:endParaRPr lang="en-US" dirty="0"/>
+          </a:p>
+        </p:txBody>
+      </p:sp>
+      <p:sp>
+        <p:nvSpPr>
+          <p:cNvPr id="29" name="Rectangle 28"/>
+          <p:cNvSpPr/>
+          <p:nvPr/>
+        </p:nvSpPr>
+        <p:spPr>
+          <a:xfrm>
+            <a:off x="1803635" y="1157997"/>
+            <a:ext cx="1206181" cy="246221"/>
+          </a:xfrm>
+          <a:prstGeom prst="rect">
+            <a:avLst/>
+          </a:prstGeom>
+        </p:spPr>
+        <p:txBody>
+          <a:bodyPr wrap="square">
+            <a:spAutoFit/>
+          </a:bodyPr>
+          <a:lstStyle/>
+          <a:p>
+            <a:pPr algn="ctr"/>
+            <a:r>
+              <a:rPr lang="en-US" sz="1000" dirty="0" smtClean="0">
+                <a:latin typeface="Times New Roman"/>
+                <a:cs typeface="Times New Roman"/>
+              </a:rPr>
+              <a:t>PageEntry_0</a:t>
+            </a:r>
+            <a:endParaRPr lang="en-US" sz="1000" dirty="0">
+              <a:latin typeface="Times New Roman"/>
+              <a:cs typeface="Times New Roman"/>
+            </a:endParaRPr>
+          </a:p>
+        </p:txBody>
+      </p:sp>
+      <p:sp>
+        <p:nvSpPr>
+          <p:cNvPr id="30" name="Rectangle 29"/>
+          <p:cNvSpPr/>
+          <p:nvPr/>
+        </p:nvSpPr>
+        <p:spPr>
+          <a:xfrm>
+            <a:off x="1793372" y="1462068"/>
+            <a:ext cx="403293" cy="704093"/>
+          </a:xfrm>
+          <a:prstGeom prst="rect">
+            <a:avLst/>
+          </a:prstGeom>
+          <a:noFill/>
+          <a:ln>
+            <a:solidFill>
+              <a:schemeClr val="tx1"/>
+            </a:solidFill>
+          </a:ln>
+          <a:effectLst/>
+        </p:spPr>
+        <p:style>
+          <a:lnRef idx="1">
+            <a:schemeClr val="accent1"/>
+          </a:lnRef>
+          <a:fillRef idx="3">
+            <a:schemeClr val="accent1"/>
+          </a:fillRef>
+          <a:effectRef idx="2">
+            <a:schemeClr val="accent1"/>
+          </a:effectRef>
+          <a:fontRef idx="minor">
+            <a:schemeClr val="lt1"/>
+          </a:fontRef>
+        </p:style>
+        <p:txBody>
+          <a:bodyPr wrap="none" rtlCol="0" anchor="ctr"/>
+          <a:lstStyle/>
+          <a:p>
+            <a:pPr algn="ctr"/>
+            <a:endParaRPr lang="en-US" dirty="0">
+              <a:solidFill>
+                <a:schemeClr val="tx1"/>
+              </a:solidFill>
+            </a:endParaRPr>
+          </a:p>
+        </p:txBody>
+      </p:sp>
+      <p:sp>
+        <p:nvSpPr>
+          <p:cNvPr id="35" name="TextBox 34"/>
+          <p:cNvSpPr txBox="1"/>
+          <p:nvPr/>
+        </p:nvSpPr>
+        <p:spPr>
+          <a:xfrm>
+            <a:off x="1767971" y="1614059"/>
+            <a:ext cx="462562" cy="400110"/>
+          </a:xfrm>
+          <a:prstGeom prst="rect">
+            <a:avLst/>
+          </a:prstGeom>
+          <a:noFill/>
+        </p:spPr>
+        <p:txBody>
+          <a:bodyPr wrap="none" rtlCol="0">
+            <a:spAutoFit/>
+          </a:bodyPr>
+          <a:lstStyle/>
+          <a:p>
+            <a:pPr algn="ctr"/>
+            <a:r>
+              <a:rPr lang="en-US" sz="1000" dirty="0" smtClean="0">
+                <a:latin typeface="Times New Roman"/>
+                <a:cs typeface="Times New Roman"/>
+              </a:rPr>
+              <a:t>Size </a:t>
+            </a:r>
+          </a:p>
+          <a:p>
+            <a:pPr algn="ctr"/>
+            <a:r>
+              <a:rPr lang="en-US" sz="1000" dirty="0" smtClean="0">
+                <a:latin typeface="Times New Roman"/>
+                <a:cs typeface="Times New Roman"/>
+              </a:rPr>
+              <a:t>Class</a:t>
+            </a:r>
+            <a:endParaRPr lang="en-US" sz="1000" dirty="0">
+              <a:latin typeface="Times New Roman"/>
+              <a:cs typeface="Times New Roman"/>
+            </a:endParaRPr>
+          </a:p>
+        </p:txBody>
+      </p:sp>
+      <p:sp>
+        <p:nvSpPr>
+          <p:cNvPr id="36" name="Rectangle 35"/>
+          <p:cNvSpPr/>
+          <p:nvPr/>
+        </p:nvSpPr>
+        <p:spPr>
+          <a:xfrm>
+            <a:off x="2606767" y="1462068"/>
+            <a:ext cx="392786" cy="704093"/>
+          </a:xfrm>
+          <a:prstGeom prst="rect">
+            <a:avLst/>
+          </a:prstGeom>
+          <a:noFill/>
+          <a:ln>
+            <a:solidFill>
+              <a:schemeClr val="tx1"/>
+            </a:solidFill>
+          </a:ln>
+          <a:effectLst/>
+        </p:spPr>
+        <p:style>
+          <a:lnRef idx="1">
+            <a:schemeClr val="accent1"/>
+          </a:lnRef>
+          <a:fillRef idx="3">
+            <a:schemeClr val="accent1"/>
+          </a:fillRef>
+          <a:effectRef idx="2">
+            <a:schemeClr val="accent1"/>
+          </a:effectRef>
+          <a:fontRef idx="minor">
+            <a:schemeClr val="lt1"/>
+          </a:fontRef>
+        </p:style>
+        <p:txBody>
+          <a:bodyPr wrap="none" rtlCol="0" anchor="ctr"/>
+          <a:lstStyle/>
+          <a:p>
+            <a:pPr algn="ctr"/>
+            <a:endParaRPr lang="en-US" dirty="0"/>
+          </a:p>
+        </p:txBody>
+      </p:sp>
+      <p:sp>
+        <p:nvSpPr>
+          <p:cNvPr id="46" name="TextBox 45"/>
+          <p:cNvSpPr txBox="1"/>
+          <p:nvPr/>
+        </p:nvSpPr>
+        <p:spPr>
+          <a:xfrm>
+            <a:off x="2169946" y="1614059"/>
+            <a:ext cx="476776" cy="400110"/>
+          </a:xfrm>
+          <a:prstGeom prst="rect">
+            <a:avLst/>
+          </a:prstGeom>
+          <a:noFill/>
+        </p:spPr>
+        <p:txBody>
+          <a:bodyPr wrap="none" rtlCol="0">
+            <a:spAutoFit/>
+          </a:bodyPr>
+          <a:lstStyle/>
+          <a:p>
+            <a:pPr algn="ctr"/>
+            <a:r>
+              <a:rPr lang="en-US" sz="1000" dirty="0" smtClean="0">
+                <a:latin typeface="Times New Roman"/>
+                <a:cs typeface="Times New Roman"/>
+              </a:rPr>
+              <a:t>Used</a:t>
+            </a:r>
+          </a:p>
+          <a:p>
+            <a:pPr algn="ctr"/>
+            <a:r>
+              <a:rPr lang="en-US" sz="1000" dirty="0" smtClean="0">
+                <a:latin typeface="Times New Roman"/>
+                <a:cs typeface="Times New Roman"/>
+              </a:rPr>
+              <a:t>Bytes</a:t>
+            </a:r>
+            <a:endParaRPr lang="en-US" sz="1000" dirty="0">
+              <a:latin typeface="Times New Roman"/>
+              <a:cs typeface="Times New Roman"/>
+            </a:endParaRPr>
+          </a:p>
+        </p:txBody>
+      </p:sp>
+      <p:sp>
+        <p:nvSpPr>
+          <p:cNvPr id="47" name="TextBox 46"/>
+          <p:cNvSpPr txBox="1"/>
+          <p:nvPr/>
+        </p:nvSpPr>
+        <p:spPr>
+          <a:xfrm>
+            <a:off x="2533629" y="1614059"/>
+            <a:ext cx="547909" cy="400110"/>
+          </a:xfrm>
+          <a:prstGeom prst="rect">
+            <a:avLst/>
+          </a:prstGeom>
+          <a:noFill/>
+        </p:spPr>
+        <p:txBody>
+          <a:bodyPr wrap="none" rtlCol="0">
+            <a:spAutoFit/>
+          </a:bodyPr>
+          <a:lstStyle/>
+          <a:p>
+            <a:pPr algn="ctr"/>
+            <a:r>
+              <a:rPr lang="en-US" sz="1000" dirty="0" smtClean="0">
+                <a:latin typeface="Times New Roman"/>
+                <a:cs typeface="Times New Roman"/>
+              </a:rPr>
+              <a:t>Cache</a:t>
+            </a:r>
+          </a:p>
+          <a:p>
+            <a:pPr algn="ctr"/>
+            <a:r>
+              <a:rPr lang="en-US" sz="1000" dirty="0" smtClean="0">
+                <a:latin typeface="Times New Roman"/>
+                <a:cs typeface="Times New Roman"/>
+              </a:rPr>
+              <a:t>Entries</a:t>
+            </a:r>
+            <a:endParaRPr lang="en-US" sz="1000" dirty="0">
+              <a:latin typeface="Times New Roman"/>
+              <a:cs typeface="Times New Roman"/>
+            </a:endParaRPr>
+          </a:p>
+        </p:txBody>
+      </p:sp>
+      <p:cxnSp>
+        <p:nvCxnSpPr>
+          <p:cNvPr id="50" name="Elbow Connector 49"/>
+          <p:cNvCxnSpPr/>
+          <p:nvPr/>
+        </p:nvCxnSpPr>
+        <p:spPr>
+          <a:xfrm rot="5400000" flipH="1" flipV="1">
+            <a:off x="5034710" y="1925573"/>
+            <a:ext cx="7657" cy="493776"/>
+          </a:xfrm>
+          <a:prstGeom prst="bentConnector3">
+            <a:avLst>
+              <a:gd name="adj1" fmla="val -2985503"/>
+            </a:avLst>
+          </a:prstGeom>
+          <a:ln w="6350">
+            <a:solidFill>
+              <a:schemeClr val="tx1"/>
+            </a:solidFill>
+            <a:tailEnd type="arrow"/>
+          </a:ln>
+          <a:effectLst/>
+        </p:spPr>
+        <p:style>
+          <a:lnRef idx="2">
+            <a:schemeClr val="accent1"/>
+          </a:lnRef>
+          <a:fillRef idx="0">
+            <a:schemeClr val="accent1"/>
+          </a:fillRef>
+          <a:effectRef idx="1">
+            <a:schemeClr val="accent1"/>
+          </a:effectRef>
+          <a:fontRef idx="minor">
+            <a:schemeClr val="tx1"/>
+          </a:fontRef>
+        </p:style>
+      </p:cxnSp>
+      <p:sp>
+        <p:nvSpPr>
+          <p:cNvPr id="53" name="Rectangle 52"/>
+          <p:cNvSpPr/>
+          <p:nvPr/>
+        </p:nvSpPr>
+        <p:spPr>
+          <a:xfrm>
+            <a:off x="5270365" y="1462499"/>
+            <a:ext cx="392786" cy="704093"/>
+          </a:xfrm>
+          <a:prstGeom prst="rect">
+            <a:avLst/>
+          </a:prstGeom>
+          <a:noFill/>
+          <a:ln>
+            <a:solidFill>
+              <a:schemeClr val="tx1"/>
+            </a:solidFill>
+          </a:ln>
+          <a:effectLst/>
+        </p:spPr>
+        <p:style>
+          <a:lnRef idx="1">
+            <a:schemeClr val="accent1"/>
+          </a:lnRef>
+          <a:fillRef idx="3">
+            <a:schemeClr val="accent1"/>
+          </a:fillRef>
+          <a:effectRef idx="2">
+            <a:schemeClr val="accent1"/>
+          </a:effectRef>
+          <a:fontRef idx="minor">
+            <a:schemeClr val="lt1"/>
+          </a:fontRef>
+        </p:style>
+        <p:txBody>
+          <a:bodyPr wrap="none" rtlCol="0" anchor="ctr"/>
+          <a:lstStyle/>
+          <a:p>
+            <a:pPr algn="ctr"/>
+            <a:endParaRPr lang="en-US" dirty="0"/>
+          </a:p>
+        </p:txBody>
+      </p:sp>
+      <p:sp>
+        <p:nvSpPr>
+          <p:cNvPr id="54" name="Rectangle 53"/>
+          <p:cNvSpPr/>
+          <p:nvPr/>
+        </p:nvSpPr>
+        <p:spPr>
+          <a:xfrm>
+            <a:off x="5239879" y="1157997"/>
+            <a:ext cx="912919" cy="246221"/>
+          </a:xfrm>
+          <a:prstGeom prst="rect">
+            <a:avLst/>
+          </a:prstGeom>
+        </p:spPr>
+        <p:txBody>
+          <a:bodyPr wrap="square">
+            <a:spAutoFit/>
+          </a:bodyPr>
+          <a:lstStyle/>
+          <a:p>
+            <a:pPr algn="ctr"/>
+            <a:r>
+              <a:rPr lang="en-US" sz="1000" dirty="0" smtClean="0">
+                <a:latin typeface="Times New Roman"/>
+                <a:cs typeface="Times New Roman"/>
+              </a:rPr>
+              <a:t>CacheEntry_0</a:t>
+            </a:r>
+            <a:endParaRPr lang="en-US" sz="1000" dirty="0">
+              <a:latin typeface="Times New Roman"/>
+              <a:cs typeface="Times New Roman"/>
+            </a:endParaRPr>
+          </a:p>
+        </p:txBody>
+      </p:sp>
+      <p:sp>
+        <p:nvSpPr>
+          <p:cNvPr id="57" name="Rectangle 56"/>
+          <p:cNvSpPr/>
+          <p:nvPr/>
+        </p:nvSpPr>
+        <p:spPr>
+          <a:xfrm>
+            <a:off x="5664851" y="1462499"/>
+            <a:ext cx="392786" cy="704093"/>
+          </a:xfrm>
+          <a:prstGeom prst="rect">
+            <a:avLst/>
+          </a:prstGeom>
+          <a:noFill/>
+          <a:ln>
+            <a:solidFill>
+              <a:schemeClr val="tx1"/>
+            </a:solidFill>
+          </a:ln>
+          <a:effectLst/>
+        </p:spPr>
+        <p:style>
+          <a:lnRef idx="1">
+            <a:schemeClr val="accent1"/>
+          </a:lnRef>
+          <a:fillRef idx="3">
+            <a:schemeClr val="accent1"/>
+          </a:fillRef>
+          <a:effectRef idx="2">
+            <a:schemeClr val="accent1"/>
+          </a:effectRef>
+          <a:fontRef idx="minor">
+            <a:schemeClr val="lt1"/>
+          </a:fontRef>
+        </p:style>
+        <p:txBody>
+          <a:bodyPr wrap="none" rtlCol="0" anchor="ctr"/>
+          <a:lstStyle/>
+          <a:p>
+            <a:pPr algn="ctr"/>
+            <a:endParaRPr lang="en-US" dirty="0"/>
+          </a:p>
+        </p:txBody>
+      </p:sp>
+      <p:sp>
+        <p:nvSpPr>
+          <p:cNvPr id="58" name="TextBox 57"/>
+          <p:cNvSpPr txBox="1"/>
+          <p:nvPr/>
+        </p:nvSpPr>
+        <p:spPr>
+          <a:xfrm>
+            <a:off x="5219563" y="1614490"/>
+            <a:ext cx="476776" cy="400110"/>
+          </a:xfrm>
+          <a:prstGeom prst="rect">
+            <a:avLst/>
+          </a:prstGeom>
+          <a:noFill/>
+        </p:spPr>
+        <p:txBody>
+          <a:bodyPr wrap="none" rtlCol="0">
+            <a:spAutoFit/>
+          </a:bodyPr>
+          <a:lstStyle/>
+          <a:p>
+            <a:pPr algn="ctr"/>
+            <a:r>
+              <a:rPr lang="en-US" sz="1000" dirty="0" smtClean="0">
+                <a:latin typeface="Times New Roman"/>
+                <a:cs typeface="Times New Roman"/>
+              </a:rPr>
+              <a:t>Used</a:t>
+            </a:r>
+          </a:p>
+          <a:p>
+            <a:pPr algn="ctr"/>
+            <a:r>
+              <a:rPr lang="en-US" sz="1000" dirty="0" smtClean="0">
+                <a:latin typeface="Times New Roman"/>
+                <a:cs typeface="Times New Roman"/>
+              </a:rPr>
+              <a:t>Bytes</a:t>
+            </a:r>
+            <a:endParaRPr lang="en-US" sz="1000" dirty="0">
+              <a:latin typeface="Times New Roman"/>
+              <a:cs typeface="Times New Roman"/>
+            </a:endParaRPr>
+          </a:p>
+        </p:txBody>
+      </p:sp>
+      <p:sp>
+        <p:nvSpPr>
+          <p:cNvPr id="59" name="TextBox 58"/>
+          <p:cNvSpPr txBox="1"/>
+          <p:nvPr/>
+        </p:nvSpPr>
+        <p:spPr>
+          <a:xfrm>
+            <a:off x="5598851" y="1691435"/>
+            <a:ext cx="533632" cy="246221"/>
+          </a:xfrm>
+          <a:prstGeom prst="rect">
+            <a:avLst/>
+          </a:prstGeom>
+          <a:noFill/>
+        </p:spPr>
+        <p:txBody>
+          <a:bodyPr wrap="none" rtlCol="0">
+            <a:spAutoFit/>
+          </a:bodyPr>
+          <a:lstStyle/>
+          <a:p>
+            <a:pPr algn="ctr"/>
+            <a:r>
+              <a:rPr lang="en-US" sz="1000" dirty="0" smtClean="0">
+                <a:latin typeface="Times New Roman"/>
+                <a:cs typeface="Times New Roman"/>
+              </a:rPr>
+              <a:t>Owner</a:t>
+            </a:r>
+            <a:endParaRPr lang="en-US" sz="1000" dirty="0">
+              <a:latin typeface="Times New Roman"/>
+              <a:cs typeface="Times New Roman"/>
+            </a:endParaRPr>
+          </a:p>
+        </p:txBody>
+      </p:sp>
+      <p:sp>
+        <p:nvSpPr>
+          <p:cNvPr id="69" name="Rectangle 68"/>
+          <p:cNvSpPr/>
+          <p:nvPr/>
+        </p:nvSpPr>
+        <p:spPr>
+          <a:xfrm>
+            <a:off x="6752034" y="1462634"/>
+            <a:ext cx="392786" cy="704093"/>
+          </a:xfrm>
+          <a:prstGeom prst="rect">
+            <a:avLst/>
+          </a:prstGeom>
+          <a:noFill/>
+          <a:ln>
+            <a:solidFill>
+              <a:schemeClr val="tx1"/>
+            </a:solidFill>
+          </a:ln>
+          <a:effectLst/>
+        </p:spPr>
+        <p:style>
+          <a:lnRef idx="1">
+            <a:schemeClr val="accent1"/>
+          </a:lnRef>
+          <a:fillRef idx="3">
+            <a:schemeClr val="accent1"/>
+          </a:fillRef>
+          <a:effectRef idx="2">
+            <a:schemeClr val="accent1"/>
+          </a:effectRef>
+          <a:fontRef idx="minor">
+            <a:schemeClr val="lt1"/>
+          </a:fontRef>
+        </p:style>
+        <p:txBody>
+          <a:bodyPr wrap="none" rtlCol="0" anchor="ctr"/>
+          <a:lstStyle/>
+          <a:p>
+            <a:pPr algn="ctr"/>
+            <a:endParaRPr lang="en-US" dirty="0"/>
+          </a:p>
+        </p:txBody>
+      </p:sp>
+      <p:sp>
+        <p:nvSpPr>
+          <p:cNvPr id="70" name="Rectangle 69"/>
+          <p:cNvSpPr/>
+          <p:nvPr/>
+        </p:nvSpPr>
+        <p:spPr>
+          <a:xfrm>
+            <a:off x="7146520" y="1462499"/>
+            <a:ext cx="392786" cy="704093"/>
+          </a:xfrm>
+          <a:prstGeom prst="rect">
+            <a:avLst/>
+          </a:prstGeom>
+          <a:noFill/>
+          <a:ln>
+            <a:solidFill>
+              <a:schemeClr val="tx1"/>
+            </a:solidFill>
+          </a:ln>
+          <a:effectLst/>
+        </p:spPr>
+        <p:style>
+          <a:lnRef idx="1">
+            <a:schemeClr val="accent1"/>
+          </a:lnRef>
+          <a:fillRef idx="3">
+            <a:schemeClr val="accent1"/>
+          </a:fillRef>
+          <a:effectRef idx="2">
+            <a:schemeClr val="accent1"/>
+          </a:effectRef>
+          <a:fontRef idx="minor">
+            <a:schemeClr val="lt1"/>
+          </a:fontRef>
+        </p:style>
+        <p:txBody>
+          <a:bodyPr wrap="none" rtlCol="0" anchor="ctr"/>
+          <a:lstStyle/>
+          <a:p>
+            <a:pPr algn="ctr"/>
+            <a:endParaRPr lang="en-US" dirty="0"/>
+          </a:p>
+        </p:txBody>
+      </p:sp>
+      <p:sp>
+        <p:nvSpPr>
+          <p:cNvPr id="71" name="TextBox 70"/>
+          <p:cNvSpPr txBox="1"/>
+          <p:nvPr/>
+        </p:nvSpPr>
+        <p:spPr>
+          <a:xfrm>
+            <a:off x="6701232" y="1614490"/>
+            <a:ext cx="476776" cy="400110"/>
+          </a:xfrm>
+          <a:prstGeom prst="rect">
+            <a:avLst/>
+          </a:prstGeom>
+          <a:noFill/>
+        </p:spPr>
+        <p:txBody>
+          <a:bodyPr wrap="none" rtlCol="0">
+            <a:spAutoFit/>
+          </a:bodyPr>
+          <a:lstStyle/>
+          <a:p>
+            <a:pPr algn="ctr"/>
+            <a:r>
+              <a:rPr lang="en-US" sz="1000" dirty="0" smtClean="0">
+                <a:latin typeface="Times New Roman"/>
+                <a:cs typeface="Times New Roman"/>
+              </a:rPr>
+              <a:t>Used</a:t>
+            </a:r>
+          </a:p>
+          <a:p>
+            <a:pPr algn="ctr"/>
+            <a:r>
+              <a:rPr lang="en-US" sz="1000" dirty="0" smtClean="0">
+                <a:latin typeface="Times New Roman"/>
+                <a:cs typeface="Times New Roman"/>
+              </a:rPr>
+              <a:t>Bytes</a:t>
+            </a:r>
+            <a:endParaRPr lang="en-US" sz="1000" dirty="0">
+              <a:latin typeface="Times New Roman"/>
+              <a:cs typeface="Times New Roman"/>
+            </a:endParaRPr>
+          </a:p>
+        </p:txBody>
+      </p:sp>
+      <p:sp>
+        <p:nvSpPr>
+          <p:cNvPr id="72" name="TextBox 71"/>
+          <p:cNvSpPr txBox="1"/>
+          <p:nvPr/>
+        </p:nvSpPr>
+        <p:spPr>
+          <a:xfrm>
+            <a:off x="7080520" y="1691435"/>
+            <a:ext cx="533632" cy="246221"/>
+          </a:xfrm>
+          <a:prstGeom prst="rect">
+            <a:avLst/>
+          </a:prstGeom>
+          <a:noFill/>
+        </p:spPr>
+        <p:txBody>
+          <a:bodyPr wrap="none" rtlCol="0">
+            <a:spAutoFit/>
+          </a:bodyPr>
+          <a:lstStyle/>
+          <a:p>
+            <a:pPr algn="ctr"/>
+            <a:r>
+              <a:rPr lang="en-US" sz="1000" dirty="0" smtClean="0">
+                <a:latin typeface="Times New Roman"/>
+                <a:cs typeface="Times New Roman"/>
+              </a:rPr>
+              <a:t>Owner</a:t>
+            </a:r>
+            <a:endParaRPr lang="en-US" sz="1000" dirty="0">
+              <a:latin typeface="Times New Roman"/>
+              <a:cs typeface="Times New Roman"/>
+            </a:endParaRPr>
+          </a:p>
+        </p:txBody>
+      </p:sp>
+      <p:sp>
+        <p:nvSpPr>
+          <p:cNvPr id="73" name="Rectangle 72"/>
+          <p:cNvSpPr/>
+          <p:nvPr/>
+        </p:nvSpPr>
+        <p:spPr>
+          <a:xfrm>
+            <a:off x="6057637" y="1462499"/>
+            <a:ext cx="688939" cy="704093"/>
+          </a:xfrm>
+          <a:prstGeom prst="rect">
+            <a:avLst/>
+          </a:prstGeom>
+          <a:noFill/>
+          <a:ln>
+            <a:solidFill>
+              <a:schemeClr val="tx1"/>
+            </a:solidFill>
+          </a:ln>
+          <a:effectLst/>
+        </p:spPr>
+        <p:style>
+          <a:lnRef idx="1">
+            <a:schemeClr val="accent1"/>
+          </a:lnRef>
+          <a:fillRef idx="3">
+            <a:schemeClr val="accent1"/>
+          </a:fillRef>
+          <a:effectRef idx="2">
+            <a:schemeClr val="accent1"/>
+          </a:effectRef>
+          <a:fontRef idx="minor">
+            <a:schemeClr val="lt1"/>
+          </a:fontRef>
+        </p:style>
+        <p:txBody>
+          <a:bodyPr wrap="none" rtlCol="0" anchor="ctr"/>
+          <a:lstStyle/>
+          <a:p>
+            <a:pPr algn="ctr"/>
+            <a:endParaRPr lang="en-US" dirty="0"/>
+          </a:p>
+        </p:txBody>
+      </p:sp>
+      <p:sp>
+        <p:nvSpPr>
+          <p:cNvPr id="74" name="TextBox 73"/>
+          <p:cNvSpPr txBox="1"/>
+          <p:nvPr/>
+        </p:nvSpPr>
+        <p:spPr>
+          <a:xfrm>
+            <a:off x="6057638" y="1657779"/>
+            <a:ext cx="688938" cy="246221"/>
+          </a:xfrm>
+          <a:prstGeom prst="rect">
+            <a:avLst/>
+          </a:prstGeom>
+          <a:noFill/>
+        </p:spPr>
+        <p:txBody>
+          <a:bodyPr wrap="square" rtlCol="0">
+            <a:spAutoFit/>
+          </a:bodyPr>
+          <a:lstStyle/>
+          <a:p>
+            <a:pPr algn="ctr"/>
+            <a:r>
+              <a:rPr lang="en-US" sz="1000" dirty="0" smtClean="0">
+                <a:latin typeface="Times New Roman"/>
+                <a:cs typeface="Times New Roman"/>
+              </a:rPr>
+              <a:t>…….</a:t>
+            </a:r>
+            <a:endParaRPr lang="en-US" sz="1000" dirty="0">
+              <a:latin typeface="Times New Roman"/>
+              <a:cs typeface="Times New Roman"/>
+            </a:endParaRPr>
+          </a:p>
+        </p:txBody>
+      </p:sp>
+      <p:sp>
+        <p:nvSpPr>
+          <p:cNvPr id="75" name="TextBox 74"/>
+          <p:cNvSpPr txBox="1"/>
+          <p:nvPr/>
+        </p:nvSpPr>
+        <p:spPr>
+          <a:xfrm>
+            <a:off x="677334" y="1691004"/>
+            <a:ext cx="618066" cy="246221"/>
+          </a:xfrm>
+          <a:prstGeom prst="rect">
+            <a:avLst/>
+          </a:prstGeom>
+          <a:noFill/>
+        </p:spPr>
+        <p:txBody>
+          <a:bodyPr wrap="square" rtlCol="0">
+            <a:spAutoFit/>
+          </a:bodyPr>
+          <a:lstStyle/>
+          <a:p>
+            <a:pPr algn="ctr"/>
+            <a:r>
+              <a:rPr lang="en-US" sz="1000" dirty="0" err="1" smtClean="0">
+                <a:latin typeface="Times New Roman"/>
+                <a:cs typeface="Times New Roman"/>
+              </a:rPr>
+              <a:t>Ptr</a:t>
+            </a:r>
+            <a:endParaRPr lang="en-US" sz="1000" dirty="0">
+              <a:latin typeface="Times New Roman"/>
+              <a:cs typeface="Times New Roman"/>
+            </a:endParaRPr>
+          </a:p>
+        </p:txBody>
+      </p:sp>
+      <p:sp>
+        <p:nvSpPr>
+          <p:cNvPr id="76" name="Rectangle 75"/>
+          <p:cNvSpPr/>
+          <p:nvPr/>
+        </p:nvSpPr>
+        <p:spPr>
+          <a:xfrm>
+            <a:off x="3783402" y="1463447"/>
+            <a:ext cx="813394" cy="704093"/>
+          </a:xfrm>
+          <a:prstGeom prst="rect">
+            <a:avLst/>
+          </a:prstGeom>
+          <a:noFill/>
+          <a:ln>
+            <a:solidFill>
+              <a:schemeClr val="tx1"/>
+            </a:solidFill>
+          </a:ln>
+          <a:effectLst/>
+        </p:spPr>
+        <p:style>
+          <a:lnRef idx="1">
+            <a:schemeClr val="accent1"/>
+          </a:lnRef>
+          <a:fillRef idx="3">
+            <a:schemeClr val="accent1"/>
+          </a:fillRef>
+          <a:effectRef idx="2">
+            <a:schemeClr val="accent1"/>
+          </a:effectRef>
+          <a:fontRef idx="minor">
+            <a:schemeClr val="lt1"/>
+          </a:fontRef>
+        </p:style>
+        <p:txBody>
+          <a:bodyPr wrap="none" rtlCol="0" anchor="ctr"/>
+          <a:lstStyle/>
+          <a:p>
+            <a:pPr algn="ctr"/>
+            <a:endParaRPr lang="en-US" dirty="0"/>
+          </a:p>
+        </p:txBody>
+      </p:sp>
+      <p:sp>
+        <p:nvSpPr>
+          <p:cNvPr id="77" name="Rectangle 76"/>
+          <p:cNvSpPr/>
+          <p:nvPr/>
+        </p:nvSpPr>
+        <p:spPr>
+          <a:xfrm>
+            <a:off x="3783401" y="1157997"/>
+            <a:ext cx="1206181" cy="246221"/>
+          </a:xfrm>
+          <a:prstGeom prst="rect">
+            <a:avLst/>
+          </a:prstGeom>
+        </p:spPr>
+        <p:txBody>
+          <a:bodyPr wrap="square">
+            <a:spAutoFit/>
+          </a:bodyPr>
+          <a:lstStyle/>
+          <a:p>
+            <a:pPr algn="ctr"/>
+            <a:r>
+              <a:rPr lang="en-US" sz="1000" dirty="0" smtClean="0">
+                <a:latin typeface="Times New Roman"/>
+                <a:cs typeface="Times New Roman"/>
+              </a:rPr>
+              <a:t>PageEntry_255</a:t>
+            </a:r>
+            <a:endParaRPr lang="en-US" sz="1000" dirty="0">
+              <a:latin typeface="Times New Roman"/>
+              <a:cs typeface="Times New Roman"/>
+            </a:endParaRPr>
+          </a:p>
+        </p:txBody>
+      </p:sp>
+      <p:sp>
+        <p:nvSpPr>
+          <p:cNvPr id="78" name="Rectangle 77"/>
+          <p:cNvSpPr/>
+          <p:nvPr/>
+        </p:nvSpPr>
+        <p:spPr>
+          <a:xfrm>
+            <a:off x="3783401" y="1463447"/>
+            <a:ext cx="403293" cy="704093"/>
+          </a:xfrm>
+          <a:prstGeom prst="rect">
+            <a:avLst/>
+          </a:prstGeom>
+          <a:noFill/>
+          <a:ln>
+            <a:solidFill>
+              <a:schemeClr val="tx1"/>
+            </a:solidFill>
+          </a:ln>
+          <a:effectLst/>
+        </p:spPr>
+        <p:style>
+          <a:lnRef idx="1">
+            <a:schemeClr val="accent1"/>
+          </a:lnRef>
+          <a:fillRef idx="3">
+            <a:schemeClr val="accent1"/>
+          </a:fillRef>
+          <a:effectRef idx="2">
+            <a:schemeClr val="accent1"/>
+          </a:effectRef>
+          <a:fontRef idx="minor">
+            <a:schemeClr val="lt1"/>
+          </a:fontRef>
+        </p:style>
+        <p:txBody>
+          <a:bodyPr wrap="none" rtlCol="0" anchor="ctr"/>
+          <a:lstStyle/>
+          <a:p>
+            <a:pPr algn="ctr"/>
+            <a:endParaRPr lang="en-US" dirty="0">
+              <a:solidFill>
+                <a:schemeClr val="tx1"/>
+              </a:solidFill>
+            </a:endParaRPr>
+          </a:p>
+        </p:txBody>
+      </p:sp>
+      <p:sp>
+        <p:nvSpPr>
+          <p:cNvPr id="79" name="TextBox 78"/>
+          <p:cNvSpPr txBox="1"/>
+          <p:nvPr/>
+        </p:nvSpPr>
+        <p:spPr>
+          <a:xfrm>
+            <a:off x="3758000" y="1615438"/>
+            <a:ext cx="462562" cy="400110"/>
+          </a:xfrm>
+          <a:prstGeom prst="rect">
+            <a:avLst/>
+          </a:prstGeom>
+          <a:noFill/>
+        </p:spPr>
+        <p:txBody>
+          <a:bodyPr wrap="none" rtlCol="0">
+            <a:spAutoFit/>
+          </a:bodyPr>
+          <a:lstStyle/>
+          <a:p>
+            <a:pPr algn="ctr"/>
+            <a:r>
+              <a:rPr lang="en-US" sz="1000" dirty="0" smtClean="0">
+                <a:latin typeface="Times New Roman"/>
+                <a:cs typeface="Times New Roman"/>
+              </a:rPr>
+              <a:t>Size </a:t>
+            </a:r>
+          </a:p>
+          <a:p>
+            <a:pPr algn="ctr"/>
+            <a:r>
+              <a:rPr lang="en-US" sz="1000" dirty="0" smtClean="0">
+                <a:latin typeface="Times New Roman"/>
+                <a:cs typeface="Times New Roman"/>
+              </a:rPr>
+              <a:t>Class</a:t>
+            </a:r>
+            <a:endParaRPr lang="en-US" sz="1000" dirty="0">
+              <a:latin typeface="Times New Roman"/>
+              <a:cs typeface="Times New Roman"/>
+            </a:endParaRPr>
+          </a:p>
+        </p:txBody>
+      </p:sp>
+      <p:sp>
+        <p:nvSpPr>
+          <p:cNvPr id="80" name="Rectangle 79"/>
+          <p:cNvSpPr/>
+          <p:nvPr/>
+        </p:nvSpPr>
+        <p:spPr>
+          <a:xfrm>
+            <a:off x="4596796" y="1463447"/>
+            <a:ext cx="392786" cy="704093"/>
+          </a:xfrm>
+          <a:prstGeom prst="rect">
+            <a:avLst/>
+          </a:prstGeom>
+          <a:noFill/>
+          <a:ln>
+            <a:solidFill>
+              <a:schemeClr val="tx1"/>
+            </a:solidFill>
+          </a:ln>
+          <a:effectLst/>
+        </p:spPr>
+        <p:style>
+          <a:lnRef idx="1">
+            <a:schemeClr val="accent1"/>
+          </a:lnRef>
+          <a:fillRef idx="3">
+            <a:schemeClr val="accent1"/>
+          </a:fillRef>
+          <a:effectRef idx="2">
+            <a:schemeClr val="accent1"/>
+          </a:effectRef>
+          <a:fontRef idx="minor">
+            <a:schemeClr val="lt1"/>
+          </a:fontRef>
+        </p:style>
+        <p:txBody>
+          <a:bodyPr wrap="none" rtlCol="0" anchor="ctr"/>
+          <a:lstStyle/>
+          <a:p>
+            <a:pPr algn="ctr"/>
+            <a:endParaRPr lang="en-US" dirty="0"/>
+          </a:p>
+        </p:txBody>
+      </p:sp>
+      <p:sp>
+        <p:nvSpPr>
+          <p:cNvPr id="81" name="TextBox 80"/>
+          <p:cNvSpPr txBox="1"/>
+          <p:nvPr/>
+        </p:nvSpPr>
+        <p:spPr>
+          <a:xfrm>
+            <a:off x="4159975" y="1615438"/>
+            <a:ext cx="476776" cy="400110"/>
+          </a:xfrm>
+          <a:prstGeom prst="rect">
+            <a:avLst/>
+          </a:prstGeom>
+          <a:noFill/>
+        </p:spPr>
+        <p:txBody>
+          <a:bodyPr wrap="none" rtlCol="0">
+            <a:spAutoFit/>
+          </a:bodyPr>
+          <a:lstStyle/>
+          <a:p>
+            <a:pPr algn="ctr"/>
+            <a:r>
+              <a:rPr lang="en-US" sz="1000" dirty="0" smtClean="0">
+                <a:latin typeface="Times New Roman"/>
+                <a:cs typeface="Times New Roman"/>
+              </a:rPr>
+              <a:t>Used</a:t>
+            </a:r>
+          </a:p>
+          <a:p>
+            <a:pPr algn="ctr"/>
+            <a:r>
+              <a:rPr lang="en-US" sz="1000" dirty="0" smtClean="0">
+                <a:latin typeface="Times New Roman"/>
+                <a:cs typeface="Times New Roman"/>
+              </a:rPr>
+              <a:t>Bytes</a:t>
+            </a:r>
+            <a:endParaRPr lang="en-US" sz="1000" dirty="0">
+              <a:latin typeface="Times New Roman"/>
+              <a:cs typeface="Times New Roman"/>
+            </a:endParaRPr>
+          </a:p>
+        </p:txBody>
+      </p:sp>
+      <p:sp>
+        <p:nvSpPr>
+          <p:cNvPr id="82" name="TextBox 81"/>
+          <p:cNvSpPr txBox="1"/>
+          <p:nvPr/>
+        </p:nvSpPr>
+        <p:spPr>
+          <a:xfrm>
+            <a:off x="4523658" y="1615438"/>
+            <a:ext cx="547909" cy="400110"/>
+          </a:xfrm>
+          <a:prstGeom prst="rect">
+            <a:avLst/>
+          </a:prstGeom>
+          <a:noFill/>
+        </p:spPr>
+        <p:txBody>
+          <a:bodyPr wrap="none" rtlCol="0">
+            <a:spAutoFit/>
+          </a:bodyPr>
+          <a:lstStyle/>
+          <a:p>
+            <a:pPr algn="ctr"/>
+            <a:r>
+              <a:rPr lang="en-US" sz="1000" dirty="0" smtClean="0">
+                <a:latin typeface="Times New Roman"/>
+                <a:cs typeface="Times New Roman"/>
+              </a:rPr>
+              <a:t>Cache</a:t>
+            </a:r>
+          </a:p>
+          <a:p>
+            <a:pPr algn="ctr"/>
+            <a:r>
+              <a:rPr lang="en-US" sz="1000" dirty="0" smtClean="0">
+                <a:latin typeface="Times New Roman"/>
+                <a:cs typeface="Times New Roman"/>
+              </a:rPr>
+              <a:t>Entries</a:t>
+            </a:r>
+            <a:endParaRPr lang="en-US" sz="1000" dirty="0">
+              <a:latin typeface="Times New Roman"/>
+              <a:cs typeface="Times New Roman"/>
+            </a:endParaRPr>
+          </a:p>
+        </p:txBody>
+      </p:sp>
+      <p:sp>
+        <p:nvSpPr>
+          <p:cNvPr id="83" name="Rectangle 82"/>
+          <p:cNvSpPr/>
+          <p:nvPr/>
+        </p:nvSpPr>
+        <p:spPr>
+          <a:xfrm>
+            <a:off x="2999553" y="1461913"/>
+            <a:ext cx="783848" cy="704093"/>
+          </a:xfrm>
+          <a:prstGeom prst="rect">
+            <a:avLst/>
+          </a:prstGeom>
+          <a:noFill/>
+          <a:ln>
+            <a:solidFill>
+              <a:schemeClr val="tx1"/>
+            </a:solidFill>
+          </a:ln>
+          <a:effectLst/>
+        </p:spPr>
+        <p:style>
+          <a:lnRef idx="1">
+            <a:schemeClr val="accent1"/>
+          </a:lnRef>
+          <a:fillRef idx="3">
+            <a:schemeClr val="accent1"/>
+          </a:fillRef>
+          <a:effectRef idx="2">
+            <a:schemeClr val="accent1"/>
+          </a:effectRef>
+          <a:fontRef idx="minor">
+            <a:schemeClr val="lt1"/>
+          </a:fontRef>
+        </p:style>
+        <p:txBody>
+          <a:bodyPr wrap="none" rtlCol="0" anchor="ctr"/>
+          <a:lstStyle/>
+          <a:p>
+            <a:pPr algn="ctr"/>
+            <a:endParaRPr lang="en-US" dirty="0"/>
+          </a:p>
+        </p:txBody>
+      </p:sp>
+      <p:sp>
+        <p:nvSpPr>
+          <p:cNvPr id="84" name="TextBox 83"/>
+          <p:cNvSpPr txBox="1"/>
+          <p:nvPr/>
+        </p:nvSpPr>
+        <p:spPr>
+          <a:xfrm>
+            <a:off x="2999554" y="1657779"/>
+            <a:ext cx="783848" cy="246221"/>
+          </a:xfrm>
+          <a:prstGeom prst="rect">
+            <a:avLst/>
+          </a:prstGeom>
+          <a:noFill/>
+        </p:spPr>
+        <p:txBody>
+          <a:bodyPr wrap="square" rtlCol="0">
+            <a:spAutoFit/>
+          </a:bodyPr>
+          <a:lstStyle/>
+          <a:p>
+            <a:pPr algn="ctr"/>
+            <a:r>
+              <a:rPr lang="en-US" sz="1000" dirty="0" smtClean="0">
+                <a:latin typeface="Times New Roman"/>
+                <a:cs typeface="Times New Roman"/>
+              </a:rPr>
+              <a:t>…….</a:t>
+            </a:r>
+            <a:endParaRPr lang="en-US" sz="1000" dirty="0">
+              <a:latin typeface="Times New Roman"/>
+              <a:cs typeface="Times New Roman"/>
+            </a:endParaRPr>
+          </a:p>
+        </p:txBody>
+      </p:sp>
+      <p:sp>
+        <p:nvSpPr>
+          <p:cNvPr id="85" name="Rectangle 84"/>
+          <p:cNvSpPr/>
+          <p:nvPr/>
+        </p:nvSpPr>
+        <p:spPr>
+          <a:xfrm>
+            <a:off x="6637867" y="1157997"/>
+            <a:ext cx="984751" cy="246221"/>
+          </a:xfrm>
+          <a:prstGeom prst="rect">
+            <a:avLst/>
+          </a:prstGeom>
+        </p:spPr>
+        <p:txBody>
+          <a:bodyPr wrap="square">
+            <a:spAutoFit/>
+          </a:bodyPr>
+          <a:lstStyle/>
+          <a:p>
+            <a:pPr algn="ctr"/>
+            <a:r>
+              <a:rPr lang="en-US" sz="1000" dirty="0" smtClean="0">
+                <a:latin typeface="Times New Roman"/>
+                <a:cs typeface="Times New Roman"/>
+              </a:rPr>
+              <a:t>CacheEntry_63</a:t>
+            </a:r>
+            <a:endParaRPr lang="en-US" sz="1000" dirty="0">
+              <a:latin typeface="Times New Roman"/>
+              <a:cs typeface="Times New Roman"/>
+            </a:endParaRPr>
+          </a:p>
+        </p:txBody>
+      </p:sp>
+      <p:sp>
+        <p:nvSpPr>
+          <p:cNvPr id="86" name="Left Brace 85"/>
+          <p:cNvSpPr/>
+          <p:nvPr/>
+        </p:nvSpPr>
+        <p:spPr>
+          <a:xfrm rot="5400000">
+            <a:off x="2351157" y="818811"/>
+            <a:ext cx="91440" cy="1207008"/>
+          </a:xfrm>
+          <a:prstGeom prst="leftBrace">
+            <a:avLst/>
+          </a:prstGeom>
+          <a:ln w="6350">
+            <a:solidFill>
+              <a:schemeClr val="tx1"/>
+            </a:solidFill>
+          </a:ln>
+          <a:effectLst/>
+        </p:spPr>
+        <p:style>
+          <a:lnRef idx="2">
+            <a:schemeClr val="accent1"/>
+          </a:lnRef>
+          <a:fillRef idx="0">
+            <a:schemeClr val="accent1"/>
+          </a:fillRef>
+          <a:effectRef idx="1">
+            <a:schemeClr val="accent1"/>
+          </a:effectRef>
+          <a:fontRef idx="minor">
+            <a:schemeClr val="tx1"/>
+          </a:fontRef>
+        </p:style>
+        <p:txBody>
+          <a:bodyPr rtlCol="0" anchor="ctr"/>
+          <a:lstStyle/>
+          <a:p>
+            <a:pPr algn="ctr"/>
+            <a:endParaRPr lang="en-US" dirty="0"/>
+          </a:p>
+        </p:txBody>
+      </p:sp>
+      <p:sp>
+        <p:nvSpPr>
+          <p:cNvPr id="41" name="Left Brace 40"/>
+          <p:cNvSpPr/>
+          <p:nvPr/>
+        </p:nvSpPr>
+        <p:spPr>
+          <a:xfrm rot="5400000">
+            <a:off x="4345057" y="818811"/>
+            <a:ext cx="91440" cy="1207008"/>
+          </a:xfrm>
+          <a:prstGeom prst="leftBrace">
+            <a:avLst/>
+          </a:prstGeom>
+          <a:ln w="6350">
+            <a:solidFill>
+              <a:schemeClr val="tx1"/>
+            </a:solidFill>
+          </a:ln>
+          <a:effectLst/>
+        </p:spPr>
+        <p:style>
+          <a:lnRef idx="2">
+            <a:schemeClr val="accent1"/>
+          </a:lnRef>
+          <a:fillRef idx="0">
+            <a:schemeClr val="accent1"/>
+          </a:fillRef>
+          <a:effectRef idx="1">
+            <a:schemeClr val="accent1"/>
+          </a:effectRef>
+          <a:fontRef idx="minor">
+            <a:schemeClr val="tx1"/>
+          </a:fontRef>
+        </p:style>
+        <p:txBody>
+          <a:bodyPr rtlCol="0" anchor="ctr"/>
+          <a:lstStyle/>
+          <a:p>
+            <a:pPr algn="ctr"/>
+            <a:endParaRPr lang="en-US" dirty="0"/>
+          </a:p>
+        </p:txBody>
+      </p:sp>
+      <p:sp>
+        <p:nvSpPr>
+          <p:cNvPr id="42" name="Left Brace 41"/>
+          <p:cNvSpPr/>
+          <p:nvPr/>
+        </p:nvSpPr>
+        <p:spPr>
+          <a:xfrm rot="5400000">
+            <a:off x="5621723" y="1029123"/>
+            <a:ext cx="91440" cy="786384"/>
+          </a:xfrm>
+          <a:prstGeom prst="leftBrace">
+            <a:avLst/>
+          </a:prstGeom>
+          <a:ln w="6350">
+            <a:solidFill>
+              <a:schemeClr val="tx1"/>
+            </a:solidFill>
+          </a:ln>
+          <a:effectLst/>
+        </p:spPr>
+        <p:style>
+          <a:lnRef idx="2">
+            <a:schemeClr val="accent1"/>
+          </a:lnRef>
+          <a:fillRef idx="0">
+            <a:schemeClr val="accent1"/>
+          </a:fillRef>
+          <a:effectRef idx="1">
+            <a:schemeClr val="accent1"/>
+          </a:effectRef>
+          <a:fontRef idx="minor">
+            <a:schemeClr val="tx1"/>
+          </a:fontRef>
+        </p:style>
+        <p:txBody>
+          <a:bodyPr rtlCol="0" anchor="ctr"/>
+          <a:lstStyle/>
+          <a:p>
+            <a:pPr algn="ctr"/>
+            <a:endParaRPr lang="en-US" dirty="0"/>
+          </a:p>
+        </p:txBody>
+      </p:sp>
+      <p:sp>
+        <p:nvSpPr>
+          <p:cNvPr id="43" name="Left Brace 42"/>
+          <p:cNvSpPr/>
+          <p:nvPr/>
+        </p:nvSpPr>
+        <p:spPr>
+          <a:xfrm rot="5400000">
+            <a:off x="7094048" y="1023001"/>
+            <a:ext cx="91440" cy="786384"/>
+          </a:xfrm>
+          <a:prstGeom prst="leftBrace">
+            <a:avLst/>
+          </a:prstGeom>
+          <a:ln w="6350">
+            <a:solidFill>
+              <a:schemeClr val="tx1"/>
+            </a:solidFill>
+          </a:ln>
+          <a:effectLst/>
+        </p:spPr>
+        <p:style>
+          <a:lnRef idx="2">
+            <a:schemeClr val="accent1"/>
+          </a:lnRef>
+          <a:fillRef idx="0">
+            <a:schemeClr val="accent1"/>
+          </a:fillRef>
+          <a:effectRef idx="1">
+            <a:schemeClr val="accent1"/>
+          </a:effectRef>
+          <a:fontRef idx="minor">
+            <a:schemeClr val="tx1"/>
+          </a:fontRef>
+        </p:style>
+        <p:txBody>
+          <a:bodyPr rtlCol="0" anchor="ctr"/>
+          <a:lstStyle/>
+          <a:p>
+            <a:pPr algn="ctr"/>
+            <a:endParaRPr lang="en-US" dirty="0"/>
+          </a:p>
+        </p:txBody>
+      </p:sp>
+    </p:spTree>
+    <p:extLst>
+      <p:ext uri="{BB962C8B-B14F-4D97-AF65-F5344CB8AC3E}">
+        <p14:creationId xmlns:p14="http://schemas.microsoft.com/office/powerpoint/2010/main" val="3627771947"/>
       </p:ext>
     </p:extLst>
   </p:cSld>
@@ -4002,4 +6180,324 @@
   </a:objectDefaults>
   <a:extraClrSchemeLst/>
 </a:theme>
+</file>
+
+<file path=ppt/theme/theme2.xml><?xml version="1.0" encoding="utf-8"?>
+<a:theme xmlns:a="http://schemas.openxmlformats.org/drawingml/2006/main" name="Office Theme">
+  <a:themeElements>
+    <a:clrScheme name="Office">
+      <a:dk1>
+        <a:sysClr val="windowText" lastClr="000000"/>
+      </a:dk1>
+      <a:lt1>
+        <a:sysClr val="window" lastClr="FFFFFF"/>
+      </a:lt1>
+      <a:dk2>
+        <a:srgbClr val="1F497D"/>
+      </a:dk2>
+      <a:lt2>
+        <a:srgbClr val="EEECE1"/>
+      </a:lt2>
+      <a:accent1>
+        <a:srgbClr val="4F81BD"/>
+      </a:accent1>
+      <a:accent2>
+        <a:srgbClr val="C0504D"/>
+      </a:accent2>
+      <a:accent3>
+        <a:srgbClr val="9BBB59"/>
+      </a:accent3>
+      <a:accent4>
+        <a:srgbClr val="8064A2"/>
+      </a:accent4>
+      <a:accent5>
+        <a:srgbClr val="4BACC6"/>
+      </a:accent5>
+      <a:accent6>
+        <a:srgbClr val="F79646"/>
+      </a:accent6>
+      <a:hlink>
+        <a:srgbClr val="0000FF"/>
+      </a:hlink>
+      <a:folHlink>
+        <a:srgbClr val="800080"/>
+      </a:folHlink>
+    </a:clrScheme>
+    <a:fontScheme name="Office">
+      <a:majorFont>
+        <a:latin typeface="Calibri"/>
+        <a:ea typeface=""/>
+        <a:cs typeface=""/>
+        <a:font script="Jpan" typeface="ＭＳ Ｐゴシック"/>
+        <a:font script="Hang" typeface="맑은 고딕"/>
+        <a:font script="Hans" typeface="宋体"/>
+        <a:font script="Hant" typeface="新細明體"/>
+        <a:font script="Arab" typeface="Times New Roman"/>
+        <a:font script="Hebr" typeface="Times New Roman"/>
+        <a:font script="Thai" typeface="Angsana New"/>
+        <a:font script="Ethi" typeface="Nyala"/>
+        <a:font script="Beng" typeface="Vrinda"/>
+        <a:font script="Gujr" typeface="Shruti"/>
+        <a:font script="Khmr" typeface="MoolBoran"/>
+        <a:font script="Knda" typeface="Tunga"/>
+        <a:font script="Guru" typeface="Raavi"/>
+        <a:font script="Cans" typeface="Euphemia"/>
+        <a:font script="Cher" typeface="Plantagenet Cherokee"/>
+        <a:font script="Yiii" typeface="Microsoft Yi Baiti"/>
+        <a:font script="Tibt" typeface="Microsoft Himalaya"/>
+        <a:font script="Thaa" typeface="MV Boli"/>
+        <a:font script="Deva" typeface="Mangal"/>
+        <a:font script="Telu" typeface="Gautami"/>
+        <a:font script="Taml" typeface="Latha"/>
+        <a:font script="Syrc" typeface="Estrangelo Edessa"/>
+        <a:font script="Orya" typeface="Kalinga"/>
+        <a:font script="Mlym" typeface="Kartika"/>
+        <a:font script="Laoo" typeface="DokChampa"/>
+        <a:font script="Sinh" typeface="Iskoola Pota"/>
+        <a:font script="Mong" typeface="Mongolian Baiti"/>
+        <a:font script="Viet" typeface="Times New Roman"/>
+        <a:font script="Uigh" typeface="Microsoft Uighur"/>
+        <a:font script="Geor" typeface="Sylfaen"/>
+      </a:majorFont>
+      <a:minorFont>
+        <a:latin typeface="Calibri"/>
+        <a:ea typeface=""/>
+        <a:cs typeface=""/>
+        <a:font script="Jpan" typeface="ＭＳ Ｐゴシック"/>
+        <a:font script="Hang" typeface="맑은 고딕"/>
+        <a:font script="Hans" typeface="宋体"/>
+        <a:font script="Hant" typeface="新細明體"/>
+        <a:font script="Arab" typeface="Arial"/>
+        <a:font script="Hebr" typeface="Arial"/>
+        <a:font script="Thai" typeface="Cordia New"/>
+        <a:font script="Ethi" typeface="Nyala"/>
+        <a:font script="Beng" typeface="Vrinda"/>
+        <a:font script="Gujr" typeface="Shruti"/>
+        <a:font script="Khmr" typeface="DaunPenh"/>
+        <a:font script="Knda" typeface="Tunga"/>
+        <a:font script="Guru" typeface="Raavi"/>
+        <a:font script="Cans" typeface="Euphemia"/>
+        <a:font script="Cher" typeface="Plantagenet Cherokee"/>
+        <a:font script="Yiii" typeface="Microsoft Yi Baiti"/>
+        <a:font script="Tibt" typeface="Microsoft Himalaya"/>
+        <a:font script="Thaa" typeface="MV Boli"/>
+        <a:font script="Deva" typeface="Mangal"/>
+        <a:font script="Telu" typeface="Gautami"/>
+        <a:font script="Taml" typeface="Latha"/>
+        <a:font script="Syrc" typeface="Estrangelo Edessa"/>
+        <a:font script="Orya" typeface="Kalinga"/>
+        <a:font script="Mlym" typeface="Kartika"/>
+        <a:font script="Laoo" typeface="DokChampa"/>
+        <a:font script="Sinh" typeface="Iskoola Pota"/>
+        <a:font script="Mong" typeface="Mongolian Baiti"/>
+        <a:font script="Viet" typeface="Arial"/>
+        <a:font script="Uigh" typeface="Microsoft Uighur"/>
+        <a:font script="Geor" typeface="Sylfaen"/>
+      </a:minorFont>
+    </a:fontScheme>
+    <a:fmtScheme name="Office">
+      <a:fillStyleLst>
+        <a:solidFill>
+          <a:schemeClr val="phClr"/>
+        </a:solidFill>
+        <a:gradFill rotWithShape="1">
+          <a:gsLst>
+            <a:gs pos="0">
+              <a:schemeClr val="phClr">
+                <a:tint val="50000"/>
+                <a:satMod val="300000"/>
+              </a:schemeClr>
+            </a:gs>
+            <a:gs pos="35000">
+              <a:schemeClr val="phClr">
+                <a:tint val="37000"/>
+                <a:satMod val="300000"/>
+              </a:schemeClr>
+            </a:gs>
+            <a:gs pos="100000">
+              <a:schemeClr val="phClr">
+                <a:tint val="15000"/>
+                <a:satMod val="350000"/>
+              </a:schemeClr>
+            </a:gs>
+          </a:gsLst>
+          <a:lin ang="16200000" scaled="1"/>
+        </a:gradFill>
+        <a:gradFill rotWithShape="1">
+          <a:gsLst>
+            <a:gs pos="0">
+              <a:schemeClr val="phClr">
+                <a:tint val="100000"/>
+                <a:shade val="100000"/>
+                <a:satMod val="130000"/>
+              </a:schemeClr>
+            </a:gs>
+            <a:gs pos="100000">
+              <a:schemeClr val="phClr">
+                <a:tint val="50000"/>
+                <a:shade val="100000"/>
+                <a:satMod val="350000"/>
+              </a:schemeClr>
+            </a:gs>
+          </a:gsLst>
+          <a:lin ang="16200000" scaled="0"/>
+        </a:gradFill>
+      </a:fillStyleLst>
+      <a:lnStyleLst>
+        <a:ln w="9525" cap="flat" cmpd="sng" algn="ctr">
+          <a:solidFill>
+            <a:schemeClr val="phClr">
+              <a:shade val="95000"/>
+              <a:satMod val="105000"/>
+            </a:schemeClr>
+          </a:solidFill>
+          <a:prstDash val="solid"/>
+        </a:ln>
+        <a:ln w="25400" cap="flat" cmpd="sng" algn="ctr">
+          <a:solidFill>
+            <a:schemeClr val="phClr"/>
+          </a:solidFill>
+          <a:prstDash val="solid"/>
+        </a:ln>
+        <a:ln w="38100" cap="flat" cmpd="sng" algn="ctr">
+          <a:solidFill>
+            <a:schemeClr val="phClr"/>
+          </a:solidFill>
+          <a:prstDash val="solid"/>
+        </a:ln>
+      </a:lnStyleLst>
+      <a:effectStyleLst>
+        <a:effectStyle>
+          <a:effectLst>
+            <a:outerShdw blurRad="40000" dist="20000" dir="5400000" rotWithShape="0">
+              <a:srgbClr val="000000">
+                <a:alpha val="38000"/>
+              </a:srgbClr>
+            </a:outerShdw>
+          </a:effectLst>
+        </a:effectStyle>
+        <a:effectStyle>
+          <a:effectLst>
+            <a:outerShdw blurRad="40000" dist="23000" dir="5400000" rotWithShape="0">
+              <a:srgbClr val="000000">
+                <a:alpha val="35000"/>
+              </a:srgbClr>
+            </a:outerShdw>
+          </a:effectLst>
+        </a:effectStyle>
+        <a:effectStyle>
+          <a:effectLst>
+            <a:outerShdw blurRad="40000" dist="23000" dir="5400000" rotWithShape="0">
+              <a:srgbClr val="000000">
+                <a:alpha val="35000"/>
+              </a:srgbClr>
+            </a:outerShdw>
+          </a:effectLst>
+          <a:scene3d>
+            <a:camera prst="orthographicFront">
+              <a:rot lat="0" lon="0" rev="0"/>
+            </a:camera>
+            <a:lightRig rig="threePt" dir="t">
+              <a:rot lat="0" lon="0" rev="1200000"/>
+            </a:lightRig>
+          </a:scene3d>
+          <a:sp3d>
+            <a:bevelT w="63500" h="25400"/>
+          </a:sp3d>
+        </a:effectStyle>
+      </a:effectStyleLst>
+      <a:bgFillStyleLst>
+        <a:solidFill>
+          <a:schemeClr val="phClr"/>
+        </a:solidFill>
+        <a:gradFill rotWithShape="1">
+          <a:gsLst>
+            <a:gs pos="0">
+              <a:schemeClr val="phClr">
+                <a:tint val="40000"/>
+                <a:satMod val="350000"/>
+              </a:schemeClr>
+            </a:gs>
+            <a:gs pos="40000">
+              <a:schemeClr val="phClr">
+                <a:tint val="45000"/>
+                <a:shade val="99000"/>
+                <a:satMod val="350000"/>
+              </a:schemeClr>
+            </a:gs>
+            <a:gs pos="100000">
+              <a:schemeClr val="phClr">
+                <a:shade val="20000"/>
+                <a:satMod val="255000"/>
+              </a:schemeClr>
+            </a:gs>
+          </a:gsLst>
+          <a:path path="circle">
+            <a:fillToRect l="50000" t="-80000" r="50000" b="180000"/>
+          </a:path>
+        </a:gradFill>
+        <a:gradFill rotWithShape="1">
+          <a:gsLst>
+            <a:gs pos="0">
+              <a:schemeClr val="phClr">
+                <a:tint val="80000"/>
+                <a:satMod val="300000"/>
+              </a:schemeClr>
+            </a:gs>
+            <a:gs pos="100000">
+              <a:schemeClr val="phClr">
+                <a:shade val="30000"/>
+                <a:satMod val="200000"/>
+              </a:schemeClr>
+            </a:gs>
+          </a:gsLst>
+          <a:path path="circle">
+            <a:fillToRect l="50000" t="50000" r="50000" b="50000"/>
+          </a:path>
+        </a:gradFill>
+      </a:bgFillStyleLst>
+    </a:fmtScheme>
+  </a:themeElements>
+  <a:objectDefaults>
+    <a:spDef>
+      <a:spPr/>
+      <a:bodyPr/>
+      <a:lstStyle/>
+      <a:style>
+        <a:lnRef idx="1">
+          <a:schemeClr val="accent1"/>
+        </a:lnRef>
+        <a:fillRef idx="3">
+          <a:schemeClr val="accent1"/>
+        </a:fillRef>
+        <a:effectRef idx="2">
+          <a:schemeClr val="accent1"/>
+        </a:effectRef>
+        <a:fontRef idx="minor">
+          <a:schemeClr val="lt1"/>
+        </a:fontRef>
+      </a:style>
+    </a:spDef>
+    <a:lnDef>
+      <a:spPr/>
+      <a:bodyPr/>
+      <a:lstStyle/>
+      <a:style>
+        <a:lnRef idx="2">
+          <a:schemeClr val="accent1"/>
+        </a:lnRef>
+        <a:fillRef idx="0">
+          <a:schemeClr val="accent1"/>
+        </a:fillRef>
+        <a:effectRef idx="1">
+          <a:schemeClr val="accent1"/>
+        </a:effectRef>
+        <a:fontRef idx="minor">
+          <a:schemeClr val="tx1"/>
+        </a:fontRef>
+      </a:style>
+    </a:lnDef>
+  </a:objectDefaults>
+  <a:extraClrSchemeLst/>
+</a:theme>
 </file>
</xml_diff>